<commit_message>
Added the informal proposal to the President of Indonesia
</commit_message>
<xml_diff>
--- a/docs/HDX_DesignChallenge.pptx
+++ b/docs/HDX_DesignChallenge.pptx
@@ -11998,27 +11998,8 @@
                 <a:ea typeface="Calibri" panose="020F0502020204030204" pitchFamily="34" charset="0"/>
                 <a:cs typeface="Calibri" panose="020F0502020204030204" pitchFamily="34" charset="0"/>
               </a:rPr>
-              <a:t>Permanent account on HDX-hosted computing </a:t>
-            </a:r>
-            <a:r>
-              <a:rPr lang="en-US" sz="2400" dirty="0" err="1">
-                <a:solidFill>
-                  <a:srgbClr val="000000"/>
-                </a:solidFill>
-                <a:latin typeface="Montserrat Light" panose="00000400000000000000" pitchFamily="50" charset="0"/>
-                <a:ea typeface="Calibri" panose="020F0502020204030204" pitchFamily="34" charset="0"/>
-                <a:cs typeface="Calibri" panose="020F0502020204030204" pitchFamily="34" charset="0"/>
-              </a:rPr>
-              <a:t>infrasrtuctures</a:t>
-            </a:r>
-            <a:endParaRPr lang="en-US" sz="2400" dirty="0">
-              <a:solidFill>
-                <a:srgbClr val="000000"/>
-              </a:solidFill>
-              <a:latin typeface="Montserrat Light" panose="00000400000000000000" pitchFamily="50" charset="0"/>
-              <a:ea typeface="Calibri" panose="020F0502020204030204" pitchFamily="34" charset="0"/>
-              <a:cs typeface="Calibri" panose="020F0502020204030204" pitchFamily="34" charset="0"/>
-            </a:endParaRPr>
+              <a:t>Permanent account on HDX-hosted computing infrastructures</a:t>
+            </a:r>
           </a:p>
           <a:p>
             <a:pPr marL="457200" indent="-457200" algn="just">

</xml_diff>